<commit_message>
added report,wbs, timeline, updated ppt
</commit_message>
<xml_diff>
--- a/group4.pptx
+++ b/group4.pptx
@@ -15,7 +15,9 @@
     <p:sldId id="263" r:id="rId9"/>
     <p:sldId id="264" r:id="rId10"/>
     <p:sldId id="265" r:id="rId11"/>
-    <p:sldId id="266" r:id="rId12"/>
+    <p:sldId id="271" r:id="rId12"/>
+    <p:sldId id="270" r:id="rId13"/>
+    <p:sldId id="266" r:id="rId14"/>
   </p:sldIdLst>
   <p:sldSz cx="12192000" cy="6858000"/>
   <p:notesSz cx="6858000" cy="9144000"/>
@@ -114,6 +116,11 @@
       </a:defRPr>
     </a:lvl9pPr>
   </p:defaultTextStyle>
+  <p:extLst>
+    <p:ext uri="{EFAFB233-063F-42B5-8137-9DF3F51BA10A}">
+      <p15:sldGuideLst xmlns:p15="http://schemas.microsoft.com/office/powerpoint/2012/main"/>
+    </p:ext>
+  </p:extLst>
 </p:presentation>
 </file>
 
@@ -3471,8 +3478,8 @@
     </dgm:pt>
   </dgm:ptLst>
   <dgm:cxnLst>
+    <dgm:cxn modelId="{204CCC66-5F60-774A-96A8-FBF9BF304447}" type="presOf" srcId="{3E00F77C-D11B-4A5D-92C3-E7167B94CC92}" destId="{70B2A89F-3E34-FC44-9799-32B502424183}" srcOrd="0" destOrd="0" presId="urn:microsoft.com/office/officeart/2005/8/layout/process4"/>
     <dgm:cxn modelId="{12DCA04F-0B4E-4A13-B2E6-3219EFDBE953}" srcId="{3E00F77C-D11B-4A5D-92C3-E7167B94CC92}" destId="{D1830C3D-8481-42FE-A0B2-82018BF1E9F2}" srcOrd="0" destOrd="0" parTransId="{F1D91ABC-8EE9-4EE0-B5D5-F388642DA2BC}" sibTransId="{FBDBA570-6CA2-41E6-BFBD-7D39D7860F26}"/>
-    <dgm:cxn modelId="{204CCC66-5F60-774A-96A8-FBF9BF304447}" type="presOf" srcId="{3E00F77C-D11B-4A5D-92C3-E7167B94CC92}" destId="{70B2A89F-3E34-FC44-9799-32B502424183}" srcOrd="0" destOrd="0" presId="urn:microsoft.com/office/officeart/2005/8/layout/process4"/>
     <dgm:cxn modelId="{3A1FB4A4-48BD-FF45-BE26-B514E558302B}" type="presOf" srcId="{D1830C3D-8481-42FE-A0B2-82018BF1E9F2}" destId="{49F79655-16D9-1240-9F63-1CF9CB1CBE55}" srcOrd="0" destOrd="0" presId="urn:microsoft.com/office/officeart/2005/8/layout/process4"/>
     <dgm:cxn modelId="{8DCC54C7-4BB6-8C4C-9986-753F224B4473}" type="presOf" srcId="{B11C3EBB-6166-47E9-AF1E-ED061CF014E7}" destId="{94839523-E5A1-A847-85A8-BEE6070C6B89}" srcOrd="0" destOrd="0" presId="urn:microsoft.com/office/officeart/2005/8/layout/process4"/>
     <dgm:cxn modelId="{55EDBFD6-4E34-458C-8472-8AB0471B7614}" srcId="{3E00F77C-D11B-4A5D-92C3-E7167B94CC92}" destId="{B11C3EBB-6166-47E9-AF1E-ED061CF014E7}" srcOrd="1" destOrd="0" parTransId="{CC9FA2F5-90C6-4865-BBB1-23E2D72E7930}" sibTransId="{0CB556B2-8A3F-4EAB-875A-DAFF0BE36BCA}"/>
@@ -3585,15 +3592,15 @@
         <a:bodyPr/>
         <a:lstStyle/>
         <a:p>
-          <a:endParaRPr lang="en-US"/>
+          <a:endParaRPr lang="en-US" dirty="0"/>
         </a:p>
         <a:p>
-          <a:endParaRPr lang="en-US"/>
+          <a:endParaRPr lang="en-US" dirty="0"/>
         </a:p>
         <a:p>
           <a:r>
-            <a:rPr lang="en-US"/>
-            <a:t>-As Julia, I want to invite my friends, so we can enjoy brunch at our backyard.</a:t>
+            <a:rPr lang="en-US" dirty="0"/>
+            <a:t>-As Julia, I want to invite my friends, so we can enjoy brunch in our backyard.</a:t>
           </a:r>
         </a:p>
       </dgm:t>
@@ -3682,8 +3689,8 @@
   <dgm:cxnLst>
     <dgm:cxn modelId="{2D6EAD0B-D9B7-6347-88DD-DCC90621EF54}" type="presOf" srcId="{862899EC-A43B-4DE7-90C1-89C3850355CE}" destId="{3DCAD7FB-7F26-3A48-A06B-4FD6874D0B65}" srcOrd="0" destOrd="0" presId="urn:microsoft.com/office/officeart/2008/layout/LinedList"/>
     <dgm:cxn modelId="{7E6AA63C-92CE-4EFB-A84D-C529A1AE27AB}" srcId="{A44D6F7E-4A1F-4516-8F43-32F066C8735C}" destId="{862899EC-A43B-4DE7-90C1-89C3850355CE}" srcOrd="0" destOrd="0" parTransId="{72CAC298-777A-41C0-95A8-9AF9087C6D2D}" sibTransId="{FD9AE083-3B37-4873-9063-6A868455C578}"/>
+    <dgm:cxn modelId="{E74BC25C-224E-1F4E-A145-35CFB0A91C17}" type="presOf" srcId="{A44D6F7E-4A1F-4516-8F43-32F066C8735C}" destId="{D385BAA5-12FF-F841-A552-B85026BACCBB}" srcOrd="0" destOrd="0" presId="urn:microsoft.com/office/officeart/2008/layout/LinedList"/>
     <dgm:cxn modelId="{5027C050-5D24-40F1-A7CC-B006990B1B11}" srcId="{A44D6F7E-4A1F-4516-8F43-32F066C8735C}" destId="{B5771E05-62B9-4B52-A40F-4009608628F2}" srcOrd="1" destOrd="0" parTransId="{8CC65BF0-767C-4324-8034-6F5560228494}" sibTransId="{86EB2010-A0B7-4F2E-9EA8-57E83D36C822}"/>
-    <dgm:cxn modelId="{E74BC25C-224E-1F4E-A145-35CFB0A91C17}" type="presOf" srcId="{A44D6F7E-4A1F-4516-8F43-32F066C8735C}" destId="{D385BAA5-12FF-F841-A552-B85026BACCBB}" srcOrd="0" destOrd="0" presId="urn:microsoft.com/office/officeart/2008/layout/LinedList"/>
     <dgm:cxn modelId="{635A21CA-6917-0347-9D6D-1F66875546D1}" type="presOf" srcId="{F9A57542-4468-4EA8-8CF7-6A3CACA09BE4}" destId="{64234C1B-23CB-784D-8BCB-3B29A0FA4559}" srcOrd="0" destOrd="0" presId="urn:microsoft.com/office/officeart/2008/layout/LinedList"/>
     <dgm:cxn modelId="{A34D5DE9-525C-E649-9042-AAD294CFD9F0}" type="presOf" srcId="{B5771E05-62B9-4B52-A40F-4009608628F2}" destId="{19783919-A2EC-234C-A0E1-48E11F5CD113}" srcOrd="0" destOrd="0" presId="urn:microsoft.com/office/officeart/2008/layout/LinedList"/>
     <dgm:cxn modelId="{6F6DF9F7-AB2C-4A45-9673-60AFF6F77C77}" srcId="{A44D6F7E-4A1F-4516-8F43-32F066C8735C}" destId="{F9A57542-4468-4EA8-8CF7-6A3CACA09BE4}" srcOrd="2" destOrd="0" parTransId="{FEBA69C0-5183-4D50-8021-B715A85D716F}" sibTransId="{3949C9F1-EF85-4DE2-9D3F-F0F7EF9FE397}"/>
@@ -3714,7 +3721,7 @@
 <dgm:dataModel xmlns:dgm="http://schemas.openxmlformats.org/drawingml/2006/diagram" xmlns:a="http://schemas.openxmlformats.org/drawingml/2006/main">
   <dgm:ptLst>
     <dgm:pt modelId="{A44D6F7E-4A1F-4516-8F43-32F066C8735C}" type="doc">
-      <dgm:prSet loTypeId="urn:microsoft.com/office/officeart/2008/layout/LinedList" loCatId="list" qsTypeId="urn:microsoft.com/office/officeart/2005/8/quickstyle/simple1" qsCatId="simple" csTypeId="urn:microsoft.com/office/officeart/2005/8/colors/colorful2" csCatId="colorful"/>
+      <dgm:prSet loTypeId="urn:microsoft.com/office/officeart/2008/layout/LinedList" loCatId="list" qsTypeId="urn:microsoft.com/office/officeart/2005/8/quickstyle/simple1" qsCatId="simple" csTypeId="urn:microsoft.com/office/officeart/2005/8/colors/colorful2" csCatId="colorful" phldr="1"/>
       <dgm:spPr/>
       <dgm:t>
         <a:bodyPr/>
@@ -3768,8 +3775,16 @@
         <a:lstStyle/>
         <a:p>
           <a:r>
-            <a:rPr lang="en-US"/>
-            <a:t>-As kevin, I want to know the most interesting news in the town, so I have something to talk at dinner table.</a:t>
+            <a:rPr lang="en-US" dirty="0"/>
+            <a:t>-As </a:t>
+          </a:r>
+          <a:r>
+            <a:rPr lang="en-US" dirty="0" err="1"/>
+            <a:t>kevin</a:t>
+          </a:r>
+          <a:r>
+            <a:rPr lang="en-US" dirty="0"/>
+            <a:t>, I want to know the most interesting news in the town, so I have something to say at the dinner table.</a:t>
           </a:r>
         </a:p>
       </dgm:t>
@@ -3804,8 +3819,8 @@
         <a:lstStyle/>
         <a:p>
           <a:r>
-            <a:rPr lang="en-US"/>
-            <a:t>-As Fred, I want to know more about the city, so I can write more on my travel diary.</a:t>
+            <a:rPr lang="en-US" dirty="0"/>
+            <a:t>-As Fred, I want to know more about the city, so I can write more in my travel diary.</a:t>
           </a:r>
         </a:p>
       </dgm:t>
@@ -3894,9 +3909,9 @@
   <dgm:cxnLst>
     <dgm:cxn modelId="{6991C50E-C6A0-1740-85B8-5B5A38AA65D5}" type="presOf" srcId="{F9A57542-4468-4EA8-8CF7-6A3CACA09BE4}" destId="{7019D234-E73B-1D41-AD7E-D2927587C171}" srcOrd="0" destOrd="0" presId="urn:microsoft.com/office/officeart/2008/layout/LinedList"/>
     <dgm:cxn modelId="{7E6AA63C-92CE-4EFB-A84D-C529A1AE27AB}" srcId="{A44D6F7E-4A1F-4516-8F43-32F066C8735C}" destId="{862899EC-A43B-4DE7-90C1-89C3850355CE}" srcOrd="0" destOrd="0" parTransId="{72CAC298-777A-41C0-95A8-9AF9087C6D2D}" sibTransId="{FD9AE083-3B37-4873-9063-6A868455C578}"/>
+    <dgm:cxn modelId="{9C4B2970-8C15-DA46-BBAD-AF8CF4AD395B}" type="presOf" srcId="{A44D6F7E-4A1F-4516-8F43-32F066C8735C}" destId="{BF10D695-F9DD-6546-AAE9-0EE8F9E468D3}" srcOrd="0" destOrd="0" presId="urn:microsoft.com/office/officeart/2008/layout/LinedList"/>
     <dgm:cxn modelId="{5027C050-5D24-40F1-A7CC-B006990B1B11}" srcId="{A44D6F7E-4A1F-4516-8F43-32F066C8735C}" destId="{B5771E05-62B9-4B52-A40F-4009608628F2}" srcOrd="1" destOrd="0" parTransId="{8CC65BF0-767C-4324-8034-6F5560228494}" sibTransId="{86EB2010-A0B7-4F2E-9EA8-57E83D36C822}"/>
     <dgm:cxn modelId="{773D7B52-7E19-8242-8131-A6E4A17A7B9B}" type="presOf" srcId="{862899EC-A43B-4DE7-90C1-89C3850355CE}" destId="{77FBEF72-706D-5C40-95C0-0F3EF635A157}" srcOrd="0" destOrd="0" presId="urn:microsoft.com/office/officeart/2008/layout/LinedList"/>
-    <dgm:cxn modelId="{9C4B2970-8C15-DA46-BBAD-AF8CF4AD395B}" type="presOf" srcId="{A44D6F7E-4A1F-4516-8F43-32F066C8735C}" destId="{BF10D695-F9DD-6546-AAE9-0EE8F9E468D3}" srcOrd="0" destOrd="0" presId="urn:microsoft.com/office/officeart/2008/layout/LinedList"/>
     <dgm:cxn modelId="{2EB654E7-B5F8-914B-B2C2-E1F3F06CC875}" type="presOf" srcId="{B5771E05-62B9-4B52-A40F-4009608628F2}" destId="{EE18F6D8-92A9-B74E-A435-7596D626BAAD}" srcOrd="0" destOrd="0" presId="urn:microsoft.com/office/officeart/2008/layout/LinedList"/>
     <dgm:cxn modelId="{6F6DF9F7-AB2C-4A45-9673-60AFF6F77C77}" srcId="{A44D6F7E-4A1F-4516-8F43-32F066C8735C}" destId="{F9A57542-4468-4EA8-8CF7-6A3CACA09BE4}" srcOrd="2" destOrd="0" parTransId="{FEBA69C0-5183-4D50-8021-B715A85D716F}" sibTransId="{3949C9F1-EF85-4DE2-9D3F-F0F7EF9FE397}"/>
     <dgm:cxn modelId="{A7A0027A-212F-5443-9BBD-ECC26C7588F8}" type="presParOf" srcId="{BF10D695-F9DD-6546-AAE9-0EE8F9E468D3}" destId="{3E157F23-D70B-AD41-ADC1-6A8403764468}" srcOrd="0" destOrd="0" presId="urn:microsoft.com/office/officeart/2008/layout/LinedList"/>
@@ -4663,7 +4678,7 @@
             </a:spcAft>
             <a:buNone/>
           </a:pPr>
-          <a:endParaRPr lang="en-US" sz="2500" kern="1200"/>
+          <a:endParaRPr lang="en-US" sz="2500" kern="1200" dirty="0"/>
         </a:p>
         <a:p>
           <a:pPr marL="0" lvl="0" indent="0" algn="l" defTabSz="1111250">
@@ -4678,7 +4693,7 @@
             </a:spcAft>
             <a:buNone/>
           </a:pPr>
-          <a:endParaRPr lang="en-US" sz="2500" kern="1200"/>
+          <a:endParaRPr lang="en-US" sz="2500" kern="1200" dirty="0"/>
         </a:p>
         <a:p>
           <a:pPr marL="0" lvl="0" indent="0" algn="l" defTabSz="1111250">
@@ -4694,8 +4709,8 @@
             <a:buNone/>
           </a:pPr>
           <a:r>
-            <a:rPr lang="en-US" sz="2500" kern="1200"/>
-            <a:t>-As Julia, I want to invite my friends, so we can enjoy brunch at our backyard.</a:t>
+            <a:rPr lang="en-US" sz="2500" kern="1200" dirty="0"/>
+            <a:t>-As Julia, I want to invite my friends, so we can enjoy brunch in our backyard.</a:t>
           </a:r>
         </a:p>
       </dsp:txBody>
@@ -4926,8 +4941,16 @@
             <a:buNone/>
           </a:pPr>
           <a:r>
-            <a:rPr lang="en-US" sz="3400" kern="1200"/>
-            <a:t>-As kevin, I want to know the most interesting news in the town, so I have something to talk at dinner table.</a:t>
+            <a:rPr lang="en-US" sz="3400" kern="1200" dirty="0"/>
+            <a:t>-As </a:t>
+          </a:r>
+          <a:r>
+            <a:rPr lang="en-US" sz="3400" kern="1200" dirty="0" err="1"/>
+            <a:t>kevin</a:t>
+          </a:r>
+          <a:r>
+            <a:rPr lang="en-US" sz="3400" kern="1200" dirty="0"/>
+            <a:t>, I want to know the most interesting news in the town, so I have something to say at the dinner table.</a:t>
           </a:r>
         </a:p>
       </dsp:txBody>
@@ -5036,8 +5059,8 @@
             <a:buNone/>
           </a:pPr>
           <a:r>
-            <a:rPr lang="en-US" sz="3400" kern="1200"/>
-            <a:t>-As Fred, I want to know more about the city, so I can write more on my travel diary.</a:t>
+            <a:rPr lang="en-US" sz="3400" kern="1200" dirty="0"/>
+            <a:t>-As Fred, I want to know more about the city, so I can write more in my travel diary.</a:t>
           </a:r>
         </a:p>
       </dsp:txBody>
@@ -11110,7 +11133,7 @@
           <a:p>
             <a:fld id="{073D55F9-11A3-4523-8F38-6BA37933791A}" type="datetime1">
               <a:rPr lang="en-US" smtClean="0"/>
-              <a:t>2/17/22</a:t>
+              <a:t>2/18/2022</a:t>
             </a:fld>
             <a:endParaRPr lang="en-US"/>
           </a:p>
@@ -11312,7 +11335,7 @@
           <a:p>
             <a:fld id="{0B4E757A-3EC2-4683-9080-1A460C37C843}" type="datetime1">
               <a:rPr lang="en-US" smtClean="0"/>
-              <a:t>2/17/22</a:t>
+              <a:t>2/18/2022</a:t>
             </a:fld>
             <a:endParaRPr lang="en-US"/>
           </a:p>
@@ -11528,7 +11551,7 @@
           <a:p>
             <a:fld id="{5CC8096C-64ED-4153-A483-5C02E44AD5C3}" type="datetime1">
               <a:rPr lang="en-US" smtClean="0"/>
-              <a:t>2/17/22</a:t>
+              <a:t>2/18/2022</a:t>
             </a:fld>
             <a:endParaRPr lang="en-US" dirty="0"/>
           </a:p>
@@ -11761,7 +11784,7 @@
           <a:p>
             <a:fld id="{1CB9D56B-6EBE-4E5F-99D9-2A3DBDF37D0A}" type="datetime1">
               <a:rPr lang="en-US" smtClean="0"/>
-              <a:t>2/17/22</a:t>
+              <a:t>2/18/2022</a:t>
             </a:fld>
             <a:endParaRPr lang="en-US"/>
           </a:p>
@@ -12038,7 +12061,7 @@
           <a:p>
             <a:fld id="{8C33F3CA-C7E3-432D-9282-18F13836509A}" type="datetime1">
               <a:rPr lang="en-US" smtClean="0"/>
-              <a:t>2/17/22</a:t>
+              <a:t>2/18/2022</a:t>
             </a:fld>
             <a:endParaRPr lang="en-US" dirty="0"/>
           </a:p>
@@ -12308,7 +12331,7 @@
           <a:p>
             <a:fld id="{75BE9C62-1337-40B8-BA50-E9F4861DB4BC}" type="datetime1">
               <a:rPr lang="en-US" smtClean="0"/>
-              <a:t>2/17/22</a:t>
+              <a:t>2/18/2022</a:t>
             </a:fld>
             <a:endParaRPr lang="en-US"/>
           </a:p>
@@ -12725,7 +12748,7 @@
           <a:p>
             <a:fld id="{47C195EB-2DA3-4B24-8725-19BC22A7BE50}" type="datetime1">
               <a:rPr lang="en-US" smtClean="0"/>
-              <a:t>2/17/22</a:t>
+              <a:t>2/18/2022</a:t>
             </a:fld>
             <a:endParaRPr lang="en-US"/>
           </a:p>
@@ -12870,7 +12893,7 @@
           <a:p>
             <a:fld id="{F4E237E6-0076-4915-A5A8-B7C11FA4F374}" type="datetime1">
               <a:rPr lang="en-US" smtClean="0"/>
-              <a:t>2/17/22</a:t>
+              <a:t>2/18/2022</a:t>
             </a:fld>
             <a:endParaRPr lang="en-US"/>
           </a:p>
@@ -12986,7 +13009,7 @@
           <a:p>
             <a:fld id="{3505F58F-C0B5-422A-8E5A-6B99E5D80F0A}" type="datetime1">
               <a:rPr lang="en-US" smtClean="0"/>
-              <a:t>2/17/22</a:t>
+              <a:t>2/18/2022</a:t>
             </a:fld>
             <a:endParaRPr lang="en-US"/>
           </a:p>
@@ -13302,7 +13325,7 @@
           <a:p>
             <a:fld id="{7565E655-9687-48DF-A33F-F8824CCCB5D1}" type="datetime1">
               <a:rPr lang="en-US" smtClean="0"/>
-              <a:t>2/17/22</a:t>
+              <a:t>2/18/2022</a:t>
             </a:fld>
             <a:endParaRPr lang="en-US"/>
           </a:p>
@@ -13598,7 +13621,7 @@
           <a:p>
             <a:fld id="{B97FD56A-AAB8-4544-A495-D0645413C9E3}" type="datetime1">
               <a:rPr lang="en-US" smtClean="0"/>
-              <a:t>2/17/22</a:t>
+              <a:t>2/18/2022</a:t>
             </a:fld>
             <a:endParaRPr lang="en-US"/>
           </a:p>
@@ -15419,7 +15442,7 @@
             <a:fld id="{193BAB95-8DA7-460B-B00A-7037C8394FB0}" type="datetime1">
               <a:rPr lang="en-US" smtClean="0"/>
               <a:pPr/>
-              <a:t>2/17/22</a:t>
+              <a:t>2/18/2022</a:t>
             </a:fld>
             <a:endParaRPr lang="en-US" dirty="0"/>
           </a:p>
@@ -18210,31 +18233,53 @@
           </a:p>
         </p:txBody>
       </p:sp>
-      <p:sp>
-        <p:nvSpPr>
-          <p:cNvPr id="3" name="Content Placeholder 2">
+      <p:pic>
+        <p:nvPicPr>
+          <p:cNvPr id="4098" name="Picture 2">
             <a:extLst>
               <a:ext uri="{FF2B5EF4-FFF2-40B4-BE49-F238E27FC236}">
-                <a16:creationId xmlns:a16="http://schemas.microsoft.com/office/drawing/2014/main" id="{539DC0B6-673A-AD4C-973E-46FB7F001367}"/>
+                <a16:creationId xmlns:a16="http://schemas.microsoft.com/office/drawing/2014/main" id="{2E8A6672-7036-49BD-80FB-6F26475A4C39}"/>
               </a:ext>
             </a:extLst>
           </p:cNvPr>
-          <p:cNvSpPr>
-            <a:spLocks noGrp="1"/>
-          </p:cNvSpPr>
-          <p:nvPr>
-            <p:ph idx="1"/>
-          </p:nvPr>
-        </p:nvSpPr>
-        <p:spPr/>
-        <p:txBody>
-          <a:bodyPr/>
-          <a:lstStyle/>
-          <a:p>
-            <a:endParaRPr lang="en-US"/>
-          </a:p>
-        </p:txBody>
-      </p:sp>
+          <p:cNvPicPr>
+            <a:picLocks noChangeAspect="1" noChangeArrowheads="1"/>
+          </p:cNvPicPr>
+          <p:nvPr/>
+        </p:nvPicPr>
+        <p:blipFill>
+          <a:blip r:embed="rId2">
+            <a:extLst>
+              <a:ext uri="{28A0092B-C50C-407E-A947-70E740481C1C}">
+                <a14:useLocalDpi xmlns:a14="http://schemas.microsoft.com/office/drawing/2010/main" val="0"/>
+              </a:ext>
+            </a:extLst>
+          </a:blip>
+          <a:srcRect/>
+          <a:stretch>
+            <a:fillRect/>
+          </a:stretch>
+        </p:blipFill>
+        <p:spPr bwMode="auto">
+          <a:xfrm>
+            <a:off x="2078375" y="1514842"/>
+            <a:ext cx="8035250" cy="5094736"/>
+          </a:xfrm>
+          <a:prstGeom prst="rect">
+            <a:avLst/>
+          </a:prstGeom>
+          <a:noFill/>
+          <a:extLst>
+            <a:ext uri="{909E8E84-426E-40DD-AFC4-6F175D3DCCD1}">
+              <a14:hiddenFill xmlns:a14="http://schemas.microsoft.com/office/drawing/2010/main">
+                <a:solidFill>
+                  <a:srgbClr val="FFFFFF"/>
+                </a:solidFill>
+              </a14:hiddenFill>
+            </a:ext>
+          </a:extLst>
+        </p:spPr>
+      </p:pic>
     </p:spTree>
     <p:extLst>
       <p:ext uri="{BB962C8B-B14F-4D97-AF65-F5344CB8AC3E}">
@@ -18249,6 +18294,111 @@
 </file>
 
 <file path=ppt/slides/slide11.xml><?xml version="1.0" encoding="utf-8"?>
+<p:sld xmlns:a="http://schemas.openxmlformats.org/drawingml/2006/main" xmlns:r="http://schemas.openxmlformats.org/officeDocument/2006/relationships" xmlns:p="http://schemas.openxmlformats.org/presentationml/2006/main">
+  <p:cSld>
+    <p:spTree>
+      <p:nvGrpSpPr>
+        <p:cNvPr id="1" name=""/>
+        <p:cNvGrpSpPr/>
+        <p:nvPr/>
+      </p:nvGrpSpPr>
+      <p:grpSpPr>
+        <a:xfrm>
+          <a:off x="0" y="0"/>
+          <a:ext cx="0" cy="0"/>
+          <a:chOff x="0" y="0"/>
+          <a:chExt cx="0" cy="0"/>
+        </a:xfrm>
+      </p:grpSpPr>
+      <p:sp>
+        <p:nvSpPr>
+          <p:cNvPr id="2" name="Title 1">
+            <a:extLst>
+              <a:ext uri="{FF2B5EF4-FFF2-40B4-BE49-F238E27FC236}">
+                <a16:creationId xmlns:a16="http://schemas.microsoft.com/office/drawing/2014/main" id="{82964369-19EA-DD4B-8EE9-3EC1A5005C09}"/>
+              </a:ext>
+            </a:extLst>
+          </p:cNvPr>
+          <p:cNvSpPr>
+            <a:spLocks noGrp="1"/>
+          </p:cNvSpPr>
+          <p:nvPr>
+            <p:ph type="title"/>
+          </p:nvPr>
+        </p:nvSpPr>
+        <p:spPr/>
+        <p:txBody>
+          <a:bodyPr/>
+          <a:lstStyle/>
+          <a:p>
+            <a:r>
+              <a:rPr lang="en-US" dirty="0"/>
+              <a:t>Wireframes and prototype</a:t>
+            </a:r>
+          </a:p>
+        </p:txBody>
+      </p:sp>
+      <p:pic>
+        <p:nvPicPr>
+          <p:cNvPr id="5122" name="Picture 2">
+            <a:extLst>
+              <a:ext uri="{FF2B5EF4-FFF2-40B4-BE49-F238E27FC236}">
+                <a16:creationId xmlns:a16="http://schemas.microsoft.com/office/drawing/2014/main" id="{13CA3991-E06F-4BE5-8D97-87EC78B4A051}"/>
+              </a:ext>
+            </a:extLst>
+          </p:cNvPr>
+          <p:cNvPicPr>
+            <a:picLocks noChangeAspect="1" noChangeArrowheads="1"/>
+          </p:cNvPicPr>
+          <p:nvPr/>
+        </p:nvPicPr>
+        <p:blipFill>
+          <a:blip r:embed="rId2">
+            <a:extLst>
+              <a:ext uri="{28A0092B-C50C-407E-A947-70E740481C1C}">
+                <a14:useLocalDpi xmlns:a14="http://schemas.microsoft.com/office/drawing/2010/main" val="0"/>
+              </a:ext>
+            </a:extLst>
+          </a:blip>
+          <a:srcRect/>
+          <a:stretch>
+            <a:fillRect/>
+          </a:stretch>
+        </p:blipFill>
+        <p:spPr bwMode="auto">
+          <a:xfrm>
+            <a:off x="2764348" y="1690688"/>
+            <a:ext cx="6663304" cy="4788144"/>
+          </a:xfrm>
+          <a:prstGeom prst="rect">
+            <a:avLst/>
+          </a:prstGeom>
+          <a:noFill/>
+          <a:extLst>
+            <a:ext uri="{909E8E84-426E-40DD-AFC4-6F175D3DCCD1}">
+              <a14:hiddenFill xmlns:a14="http://schemas.microsoft.com/office/drawing/2010/main">
+                <a:solidFill>
+                  <a:srgbClr val="FFFFFF"/>
+                </a:solidFill>
+              </a14:hiddenFill>
+            </a:ext>
+          </a:extLst>
+        </p:spPr>
+      </p:pic>
+    </p:spTree>
+    <p:extLst>
+      <p:ext uri="{BB962C8B-B14F-4D97-AF65-F5344CB8AC3E}">
+        <p14:creationId xmlns:p14="http://schemas.microsoft.com/office/powerpoint/2010/main" val="157360346"/>
+      </p:ext>
+    </p:extLst>
+  </p:cSld>
+  <p:clrMapOvr>
+    <a:masterClrMapping/>
+  </p:clrMapOvr>
+</p:sld>
+</file>
+
+<file path=ppt/slides/slide12.xml><?xml version="1.0" encoding="utf-8"?>
 <p:sld xmlns:a="http://schemas.openxmlformats.org/drawingml/2006/main" xmlns:r="http://schemas.openxmlformats.org/officeDocument/2006/relationships" xmlns:p="http://schemas.openxmlformats.org/presentationml/2006/main">
   <p:cSld>
     <p:spTree>
@@ -18293,12 +18443,89 @@
           </a:p>
         </p:txBody>
       </p:sp>
+      <p:pic>
+        <p:nvPicPr>
+          <p:cNvPr id="3074" name="Picture 2">
+            <a:extLst>
+              <a:ext uri="{FF2B5EF4-FFF2-40B4-BE49-F238E27FC236}">
+                <a16:creationId xmlns:a16="http://schemas.microsoft.com/office/drawing/2014/main" id="{AE3627C4-0A02-4106-8824-EED9B8587265}"/>
+              </a:ext>
+            </a:extLst>
+          </p:cNvPr>
+          <p:cNvPicPr>
+            <a:picLocks noChangeAspect="1" noChangeArrowheads="1"/>
+          </p:cNvPicPr>
+          <p:nvPr/>
+        </p:nvPicPr>
+        <p:blipFill>
+          <a:blip r:embed="rId2">
+            <a:extLst>
+              <a:ext uri="{28A0092B-C50C-407E-A947-70E740481C1C}">
+                <a14:useLocalDpi xmlns:a14="http://schemas.microsoft.com/office/drawing/2010/main" val="0"/>
+              </a:ext>
+            </a:extLst>
+          </a:blip>
+          <a:srcRect/>
+          <a:stretch>
+            <a:fillRect/>
+          </a:stretch>
+        </p:blipFill>
+        <p:spPr bwMode="auto">
+          <a:xfrm>
+            <a:off x="1208611" y="365125"/>
+            <a:ext cx="9774777" cy="5799701"/>
+          </a:xfrm>
+          <a:prstGeom prst="rect">
+            <a:avLst/>
+          </a:prstGeom>
+          <a:noFill/>
+          <a:extLst>
+            <a:ext uri="{909E8E84-426E-40DD-AFC4-6F175D3DCCD1}">
+              <a14:hiddenFill xmlns:a14="http://schemas.microsoft.com/office/drawing/2010/main">
+                <a:solidFill>
+                  <a:srgbClr val="FFFFFF"/>
+                </a:solidFill>
+              </a14:hiddenFill>
+            </a:ext>
+          </a:extLst>
+        </p:spPr>
+      </p:pic>
+    </p:spTree>
+    <p:extLst>
+      <p:ext uri="{BB962C8B-B14F-4D97-AF65-F5344CB8AC3E}">
+        <p14:creationId xmlns:p14="http://schemas.microsoft.com/office/powerpoint/2010/main" val="1758584525"/>
+      </p:ext>
+    </p:extLst>
+  </p:cSld>
+  <p:clrMapOvr>
+    <a:masterClrMapping/>
+  </p:clrMapOvr>
+</p:sld>
+</file>
+
+<file path=ppt/slides/slide13.xml><?xml version="1.0" encoding="utf-8"?>
+<p:sld xmlns:a="http://schemas.openxmlformats.org/drawingml/2006/main" xmlns:r="http://schemas.openxmlformats.org/officeDocument/2006/relationships" xmlns:p="http://schemas.openxmlformats.org/presentationml/2006/main">
+  <p:cSld>
+    <p:spTree>
+      <p:nvGrpSpPr>
+        <p:cNvPr id="1" name=""/>
+        <p:cNvGrpSpPr/>
+        <p:nvPr/>
+      </p:nvGrpSpPr>
+      <p:grpSpPr>
+        <a:xfrm>
+          <a:off x="0" y="0"/>
+          <a:ext cx="0" cy="0"/>
+          <a:chOff x="0" y="0"/>
+          <a:chExt cx="0" cy="0"/>
+        </a:xfrm>
+      </p:grpSpPr>
       <p:sp>
         <p:nvSpPr>
-          <p:cNvPr id="3" name="Content Placeholder 2">
+          <p:cNvPr id="2" name="Title 1">
             <a:extLst>
               <a:ext uri="{FF2B5EF4-FFF2-40B4-BE49-F238E27FC236}">
-                <a16:creationId xmlns:a16="http://schemas.microsoft.com/office/drawing/2014/main" id="{CF226B47-7827-4344-9014-328C4E675323}"/>
+                <a16:creationId xmlns:a16="http://schemas.microsoft.com/office/drawing/2014/main" id="{9A7310DE-64EE-8C4A-837F-43823927C9E9}"/>
               </a:ext>
             </a:extLst>
           </p:cNvPr>
@@ -18306,7 +18533,7 @@
             <a:spLocks noGrp="1"/>
           </p:cNvSpPr>
           <p:nvPr>
-            <p:ph idx="1"/>
+            <p:ph type="title"/>
           </p:nvPr>
         </p:nvSpPr>
         <p:spPr/>
@@ -18314,10 +18541,60 @@
           <a:bodyPr/>
           <a:lstStyle/>
           <a:p>
-            <a:endParaRPr lang="en-US"/>
+            <a:r>
+              <a:rPr lang="en-US" dirty="0"/>
+              <a:t>Data flow diagram</a:t>
+            </a:r>
           </a:p>
         </p:txBody>
       </p:sp>
+      <p:pic>
+        <p:nvPicPr>
+          <p:cNvPr id="3078" name="Picture 6">
+            <a:extLst>
+              <a:ext uri="{FF2B5EF4-FFF2-40B4-BE49-F238E27FC236}">
+                <a16:creationId xmlns:a16="http://schemas.microsoft.com/office/drawing/2014/main" id="{0A7461C3-6D00-43B4-96AE-806646B24FA3}"/>
+              </a:ext>
+            </a:extLst>
+          </p:cNvPr>
+          <p:cNvPicPr>
+            <a:picLocks noChangeAspect="1" noChangeArrowheads="1"/>
+          </p:cNvPicPr>
+          <p:nvPr/>
+        </p:nvPicPr>
+        <p:blipFill>
+          <a:blip r:embed="rId2">
+            <a:extLst>
+              <a:ext uri="{28A0092B-C50C-407E-A947-70E740481C1C}">
+                <a14:useLocalDpi xmlns:a14="http://schemas.microsoft.com/office/drawing/2010/main" val="0"/>
+              </a:ext>
+            </a:extLst>
+          </a:blip>
+          <a:srcRect/>
+          <a:stretch>
+            <a:fillRect/>
+          </a:stretch>
+        </p:blipFill>
+        <p:spPr bwMode="auto">
+          <a:xfrm>
+            <a:off x="3751990" y="471948"/>
+            <a:ext cx="4688020" cy="6281715"/>
+          </a:xfrm>
+          <a:prstGeom prst="rect">
+            <a:avLst/>
+          </a:prstGeom>
+          <a:noFill/>
+          <a:extLst>
+            <a:ext uri="{909E8E84-426E-40DD-AFC4-6F175D3DCCD1}">
+              <a14:hiddenFill xmlns:a14="http://schemas.microsoft.com/office/drawing/2010/main">
+                <a:solidFill>
+                  <a:srgbClr val="FFFFFF"/>
+                </a:solidFill>
+              </a14:hiddenFill>
+            </a:ext>
+          </a:extLst>
+        </p:spPr>
+      </p:pic>
     </p:spTree>
     <p:extLst>
       <p:ext uri="{BB962C8B-B14F-4D97-AF65-F5344CB8AC3E}">
@@ -24431,7 +24708,7 @@
             <p:ph idx="1"/>
             <p:extLst>
               <p:ext uri="{D42A27DB-BD31-4B8C-83A1-F6EECF244321}">
-                <p14:modId xmlns:p14="http://schemas.microsoft.com/office/powerpoint/2010/main" val="1016101190"/>
+                <p14:modId xmlns:p14="http://schemas.microsoft.com/office/powerpoint/2010/main" val="2516246696"/>
               </p:ext>
             </p:extLst>
           </p:nvPr>
@@ -26433,7 +26710,7 @@
             <p:ph idx="1"/>
             <p:extLst>
               <p:ext uri="{D42A27DB-BD31-4B8C-83A1-F6EECF244321}">
-                <p14:modId xmlns:p14="http://schemas.microsoft.com/office/powerpoint/2010/main" val="3033974723"/>
+                <p14:modId xmlns:p14="http://schemas.microsoft.com/office/powerpoint/2010/main" val="2087869367"/>
               </p:ext>
             </p:extLst>
           </p:nvPr>
@@ -30753,31 +31030,53 @@
           </a:p>
         </p:txBody>
       </p:sp>
-      <p:sp>
-        <p:nvSpPr>
-          <p:cNvPr id="3" name="Content Placeholder 2">
+      <p:pic>
+        <p:nvPicPr>
+          <p:cNvPr id="2050" name="Picture 2">
             <a:extLst>
               <a:ext uri="{FF2B5EF4-FFF2-40B4-BE49-F238E27FC236}">
-                <a16:creationId xmlns:a16="http://schemas.microsoft.com/office/drawing/2014/main" id="{3B51D21D-136D-4447-8F26-1FBE48BF9B34}"/>
+                <a16:creationId xmlns:a16="http://schemas.microsoft.com/office/drawing/2014/main" id="{5728F656-6295-4816-A709-CB61AC250CB7}"/>
               </a:ext>
             </a:extLst>
           </p:cNvPr>
-          <p:cNvSpPr>
-            <a:spLocks noGrp="1"/>
-          </p:cNvSpPr>
-          <p:nvPr>
-            <p:ph idx="1"/>
-          </p:nvPr>
-        </p:nvSpPr>
-        <p:spPr/>
-        <p:txBody>
-          <a:bodyPr/>
-          <a:lstStyle/>
-          <a:p>
-            <a:endParaRPr lang="en-US"/>
-          </a:p>
-        </p:txBody>
-      </p:sp>
+          <p:cNvPicPr>
+            <a:picLocks noChangeAspect="1" noChangeArrowheads="1"/>
+          </p:cNvPicPr>
+          <p:nvPr/>
+        </p:nvPicPr>
+        <p:blipFill>
+          <a:blip r:embed="rId2">
+            <a:extLst>
+              <a:ext uri="{28A0092B-C50C-407E-A947-70E740481C1C}">
+                <a14:useLocalDpi xmlns:a14="http://schemas.microsoft.com/office/drawing/2010/main" val="0"/>
+              </a:ext>
+            </a:extLst>
+          </a:blip>
+          <a:srcRect/>
+          <a:stretch>
+            <a:fillRect/>
+          </a:stretch>
+        </p:blipFill>
+        <p:spPr bwMode="auto">
+          <a:xfrm>
+            <a:off x="1475545" y="1323234"/>
+            <a:ext cx="9240909" cy="5189305"/>
+          </a:xfrm>
+          <a:prstGeom prst="rect">
+            <a:avLst/>
+          </a:prstGeom>
+          <a:noFill/>
+          <a:extLst>
+            <a:ext uri="{909E8E84-426E-40DD-AFC4-6F175D3DCCD1}">
+              <a14:hiddenFill xmlns:a14="http://schemas.microsoft.com/office/drawing/2010/main">
+                <a:solidFill>
+                  <a:srgbClr val="FFFFFF"/>
+                </a:solidFill>
+              </a14:hiddenFill>
+            </a:ext>
+          </a:extLst>
+        </p:spPr>
+      </p:pic>
     </p:spTree>
     <p:extLst>
       <p:ext uri="{BB962C8B-B14F-4D97-AF65-F5344CB8AC3E}">
@@ -30836,31 +31135,55 @@
           </a:p>
         </p:txBody>
       </p:sp>
-      <p:sp>
-        <p:nvSpPr>
-          <p:cNvPr id="3" name="Content Placeholder 2">
+      <p:pic>
+        <p:nvPicPr>
+          <p:cNvPr id="1026" name="Picture 2">
             <a:extLst>
               <a:ext uri="{FF2B5EF4-FFF2-40B4-BE49-F238E27FC236}">
-                <a16:creationId xmlns:a16="http://schemas.microsoft.com/office/drawing/2014/main" id="{158886B2-8373-974E-AE2B-0509E3121FA0}"/>
+                <a16:creationId xmlns:a16="http://schemas.microsoft.com/office/drawing/2014/main" id="{D5077B36-D9EB-47B3-B69E-05B6169012FA}"/>
               </a:ext>
             </a:extLst>
           </p:cNvPr>
-          <p:cNvSpPr>
-            <a:spLocks noGrp="1"/>
-          </p:cNvSpPr>
+          <p:cNvPicPr>
+            <a:picLocks noGrp="1" noChangeAspect="1" noChangeArrowheads="1"/>
+          </p:cNvPicPr>
           <p:nvPr>
             <p:ph idx="1"/>
           </p:nvPr>
-        </p:nvSpPr>
-        <p:spPr/>
-        <p:txBody>
-          <a:bodyPr/>
-          <a:lstStyle/>
-          <a:p>
-            <a:endParaRPr lang="en-US"/>
-          </a:p>
-        </p:txBody>
-      </p:sp>
+        </p:nvPicPr>
+        <p:blipFill>
+          <a:blip r:embed="rId2">
+            <a:extLst>
+              <a:ext uri="{28A0092B-C50C-407E-A947-70E740481C1C}">
+                <a14:useLocalDpi xmlns:a14="http://schemas.microsoft.com/office/drawing/2010/main" val="0"/>
+              </a:ext>
+            </a:extLst>
+          </a:blip>
+          <a:srcRect/>
+          <a:stretch>
+            <a:fillRect/>
+          </a:stretch>
+        </p:blipFill>
+        <p:spPr bwMode="auto">
+          <a:xfrm>
+            <a:off x="155996" y="1813763"/>
+            <a:ext cx="11880008" cy="3578852"/>
+          </a:xfrm>
+          <a:prstGeom prst="rect">
+            <a:avLst/>
+          </a:prstGeom>
+          <a:noFill/>
+          <a:extLst>
+            <a:ext uri="{909E8E84-426E-40DD-AFC4-6F175D3DCCD1}">
+              <a14:hiddenFill xmlns:a14="http://schemas.microsoft.com/office/drawing/2010/main">
+                <a:solidFill>
+                  <a:srgbClr val="FFFFFF"/>
+                </a:solidFill>
+              </a14:hiddenFill>
+            </a:ext>
+          </a:extLst>
+        </p:spPr>
+      </p:pic>
     </p:spTree>
     <p:extLst>
       <p:ext uri="{BB962C8B-B14F-4D97-AF65-F5344CB8AC3E}">

</xml_diff>